<commit_message>
Add QR-code to repository
</commit_message>
<xml_diff>
--- a/Metafiles/Презентация.pptx
+++ b/Metafiles/Презентация.pptx
@@ -120,7 +120,7 @@
   </p:defaultTextStyle>
   <p:extLst>
     <p:ext uri="{EFAFB233-063F-42B5-8137-9DF3F51BA10A}">
-      <p15:sldGuideLst xmlns="" xmlns:p15="http://schemas.microsoft.com/office/powerpoint/2012/main"/>
+      <p15:sldGuideLst xmlns:p15="http://schemas.microsoft.com/office/powerpoint/2012/main" xmlns=""/>
     </p:ext>
   </p:extLst>
 </p:presentation>
@@ -258,7 +258,7 @@
             <a:fld id="{30C36AC2-90A7-4CB8-82BB-713FD39F16DD}" type="datetimeFigureOut">
               <a:rPr lang="ru-RU" smtClean="0"/>
               <a:pPr/>
-              <a:t>12.02.2022</a:t>
+              <a:t>17.04.2022</a:t>
             </a:fld>
             <a:endParaRPr lang="ru-RU"/>
           </a:p>
@@ -310,7 +310,7 @@
     </p:spTree>
     <p:extLst>
       <p:ext uri="{BB962C8B-B14F-4D97-AF65-F5344CB8AC3E}">
-        <p14:creationId xmlns="" xmlns:p14="http://schemas.microsoft.com/office/powerpoint/2010/main" val="4042753250"/>
+        <p14:creationId xmlns:p14="http://schemas.microsoft.com/office/powerpoint/2010/main" xmlns="" val="4042753250"/>
       </p:ext>
     </p:extLst>
   </p:cSld>
@@ -430,7 +430,7 @@
             <a:fld id="{30C36AC2-90A7-4CB8-82BB-713FD39F16DD}" type="datetimeFigureOut">
               <a:rPr lang="ru-RU" smtClean="0"/>
               <a:pPr/>
-              <a:t>12.02.2022</a:t>
+              <a:t>17.04.2022</a:t>
             </a:fld>
             <a:endParaRPr lang="ru-RU"/>
           </a:p>
@@ -482,7 +482,7 @@
     </p:spTree>
     <p:extLst>
       <p:ext uri="{BB962C8B-B14F-4D97-AF65-F5344CB8AC3E}">
-        <p14:creationId xmlns="" xmlns:p14="http://schemas.microsoft.com/office/powerpoint/2010/main" val="1182181703"/>
+        <p14:creationId xmlns:p14="http://schemas.microsoft.com/office/powerpoint/2010/main" xmlns="" val="1182181703"/>
       </p:ext>
     </p:extLst>
   </p:cSld>
@@ -612,7 +612,7 @@
             <a:fld id="{30C36AC2-90A7-4CB8-82BB-713FD39F16DD}" type="datetimeFigureOut">
               <a:rPr lang="ru-RU" smtClean="0"/>
               <a:pPr/>
-              <a:t>12.02.2022</a:t>
+              <a:t>17.04.2022</a:t>
             </a:fld>
             <a:endParaRPr lang="ru-RU"/>
           </a:p>
@@ -664,7 +664,7 @@
     </p:spTree>
     <p:extLst>
       <p:ext uri="{BB962C8B-B14F-4D97-AF65-F5344CB8AC3E}">
-        <p14:creationId xmlns="" xmlns:p14="http://schemas.microsoft.com/office/powerpoint/2010/main" val="3580666948"/>
+        <p14:creationId xmlns:p14="http://schemas.microsoft.com/office/powerpoint/2010/main" xmlns="" val="3580666948"/>
       </p:ext>
     </p:extLst>
   </p:cSld>
@@ -784,7 +784,7 @@
             <a:fld id="{30C36AC2-90A7-4CB8-82BB-713FD39F16DD}" type="datetimeFigureOut">
               <a:rPr lang="ru-RU" smtClean="0"/>
               <a:pPr/>
-              <a:t>12.02.2022</a:t>
+              <a:t>17.04.2022</a:t>
             </a:fld>
             <a:endParaRPr lang="ru-RU"/>
           </a:p>
@@ -836,7 +836,7 @@
     </p:spTree>
     <p:extLst>
       <p:ext uri="{BB962C8B-B14F-4D97-AF65-F5344CB8AC3E}">
-        <p14:creationId xmlns="" xmlns:p14="http://schemas.microsoft.com/office/powerpoint/2010/main" val="668245544"/>
+        <p14:creationId xmlns:p14="http://schemas.microsoft.com/office/powerpoint/2010/main" xmlns="" val="668245544"/>
       </p:ext>
     </p:extLst>
   </p:cSld>
@@ -1032,7 +1032,7 @@
             <a:fld id="{30C36AC2-90A7-4CB8-82BB-713FD39F16DD}" type="datetimeFigureOut">
               <a:rPr lang="ru-RU" smtClean="0"/>
               <a:pPr/>
-              <a:t>12.02.2022</a:t>
+              <a:t>17.04.2022</a:t>
             </a:fld>
             <a:endParaRPr lang="ru-RU"/>
           </a:p>
@@ -1084,7 +1084,7 @@
     </p:spTree>
     <p:extLst>
       <p:ext uri="{BB962C8B-B14F-4D97-AF65-F5344CB8AC3E}">
-        <p14:creationId xmlns="" xmlns:p14="http://schemas.microsoft.com/office/powerpoint/2010/main" val="1669718503"/>
+        <p14:creationId xmlns:p14="http://schemas.microsoft.com/office/powerpoint/2010/main" xmlns="" val="1669718503"/>
       </p:ext>
     </p:extLst>
   </p:cSld>
@@ -1266,7 +1266,7 @@
             <a:fld id="{30C36AC2-90A7-4CB8-82BB-713FD39F16DD}" type="datetimeFigureOut">
               <a:rPr lang="ru-RU" smtClean="0"/>
               <a:pPr/>
-              <a:t>12.02.2022</a:t>
+              <a:t>17.04.2022</a:t>
             </a:fld>
             <a:endParaRPr lang="ru-RU"/>
           </a:p>
@@ -1318,7 +1318,7 @@
     </p:spTree>
     <p:extLst>
       <p:ext uri="{BB962C8B-B14F-4D97-AF65-F5344CB8AC3E}">
-        <p14:creationId xmlns="" xmlns:p14="http://schemas.microsoft.com/office/powerpoint/2010/main" val="3235771681"/>
+        <p14:creationId xmlns:p14="http://schemas.microsoft.com/office/powerpoint/2010/main" xmlns="" val="3235771681"/>
       </p:ext>
     </p:extLst>
   </p:cSld>
@@ -1635,7 +1635,7 @@
             <a:fld id="{30C36AC2-90A7-4CB8-82BB-713FD39F16DD}" type="datetimeFigureOut">
               <a:rPr lang="ru-RU" smtClean="0"/>
               <a:pPr/>
-              <a:t>12.02.2022</a:t>
+              <a:t>17.04.2022</a:t>
             </a:fld>
             <a:endParaRPr lang="ru-RU"/>
           </a:p>
@@ -1687,7 +1687,7 @@
     </p:spTree>
     <p:extLst>
       <p:ext uri="{BB962C8B-B14F-4D97-AF65-F5344CB8AC3E}">
-        <p14:creationId xmlns="" xmlns:p14="http://schemas.microsoft.com/office/powerpoint/2010/main" val="610206296"/>
+        <p14:creationId xmlns:p14="http://schemas.microsoft.com/office/powerpoint/2010/main" xmlns="" val="610206296"/>
       </p:ext>
     </p:extLst>
   </p:cSld>
@@ -1755,7 +1755,7 @@
             <a:fld id="{30C36AC2-90A7-4CB8-82BB-713FD39F16DD}" type="datetimeFigureOut">
               <a:rPr lang="ru-RU" smtClean="0"/>
               <a:pPr/>
-              <a:t>12.02.2022</a:t>
+              <a:t>17.04.2022</a:t>
             </a:fld>
             <a:endParaRPr lang="ru-RU"/>
           </a:p>
@@ -1807,7 +1807,7 @@
     </p:spTree>
     <p:extLst>
       <p:ext uri="{BB962C8B-B14F-4D97-AF65-F5344CB8AC3E}">
-        <p14:creationId xmlns="" xmlns:p14="http://schemas.microsoft.com/office/powerpoint/2010/main" val="2572720333"/>
+        <p14:creationId xmlns:p14="http://schemas.microsoft.com/office/powerpoint/2010/main" xmlns="" val="2572720333"/>
       </p:ext>
     </p:extLst>
   </p:cSld>
@@ -1852,7 +1852,7 @@
             <a:fld id="{30C36AC2-90A7-4CB8-82BB-713FD39F16DD}" type="datetimeFigureOut">
               <a:rPr lang="ru-RU" smtClean="0"/>
               <a:pPr/>
-              <a:t>12.02.2022</a:t>
+              <a:t>17.04.2022</a:t>
             </a:fld>
             <a:endParaRPr lang="ru-RU"/>
           </a:p>
@@ -1904,7 +1904,7 @@
     </p:spTree>
     <p:extLst>
       <p:ext uri="{BB962C8B-B14F-4D97-AF65-F5344CB8AC3E}">
-        <p14:creationId xmlns="" xmlns:p14="http://schemas.microsoft.com/office/powerpoint/2010/main" val="2070872433"/>
+        <p14:creationId xmlns:p14="http://schemas.microsoft.com/office/powerpoint/2010/main" xmlns="" val="2070872433"/>
       </p:ext>
     </p:extLst>
   </p:cSld>
@@ -2131,7 +2131,7 @@
             <a:fld id="{30C36AC2-90A7-4CB8-82BB-713FD39F16DD}" type="datetimeFigureOut">
               <a:rPr lang="ru-RU" smtClean="0"/>
               <a:pPr/>
-              <a:t>12.02.2022</a:t>
+              <a:t>17.04.2022</a:t>
             </a:fld>
             <a:endParaRPr lang="ru-RU"/>
           </a:p>
@@ -2183,7 +2183,7 @@
     </p:spTree>
     <p:extLst>
       <p:ext uri="{BB962C8B-B14F-4D97-AF65-F5344CB8AC3E}">
-        <p14:creationId xmlns="" xmlns:p14="http://schemas.microsoft.com/office/powerpoint/2010/main" val="827917759"/>
+        <p14:creationId xmlns:p14="http://schemas.microsoft.com/office/powerpoint/2010/main" xmlns="" val="827917759"/>
       </p:ext>
     </p:extLst>
   </p:cSld>
@@ -2386,7 +2386,7 @@
             <a:fld id="{30C36AC2-90A7-4CB8-82BB-713FD39F16DD}" type="datetimeFigureOut">
               <a:rPr lang="ru-RU" smtClean="0"/>
               <a:pPr/>
-              <a:t>12.02.2022</a:t>
+              <a:t>17.04.2022</a:t>
             </a:fld>
             <a:endParaRPr lang="ru-RU"/>
           </a:p>
@@ -2438,7 +2438,7 @@
     </p:spTree>
     <p:extLst>
       <p:ext uri="{BB962C8B-B14F-4D97-AF65-F5344CB8AC3E}">
-        <p14:creationId xmlns="" xmlns:p14="http://schemas.microsoft.com/office/powerpoint/2010/main" val="1944592533"/>
+        <p14:creationId xmlns:p14="http://schemas.microsoft.com/office/powerpoint/2010/main" xmlns="" val="1944592533"/>
       </p:ext>
     </p:extLst>
   </p:cSld>
@@ -2601,7 +2601,7 @@
             <a:fld id="{30C36AC2-90A7-4CB8-82BB-713FD39F16DD}" type="datetimeFigureOut">
               <a:rPr lang="ru-RU" smtClean="0"/>
               <a:pPr/>
-              <a:t>12.02.2022</a:t>
+              <a:t>17.04.2022</a:t>
             </a:fld>
             <a:endParaRPr lang="ru-RU"/>
           </a:p>
@@ -2689,7 +2689,7 @@
     </p:spTree>
     <p:extLst>
       <p:ext uri="{BB962C8B-B14F-4D97-AF65-F5344CB8AC3E}">
-        <p14:creationId xmlns="" xmlns:p14="http://schemas.microsoft.com/office/powerpoint/2010/main" val="2395206212"/>
+        <p14:creationId xmlns:p14="http://schemas.microsoft.com/office/powerpoint/2010/main" xmlns="" val="2395206212"/>
       </p:ext>
     </p:extLst>
   </p:cSld>
@@ -3063,7 +3063,7 @@
     </p:spTree>
     <p:extLst>
       <p:ext uri="{BB962C8B-B14F-4D97-AF65-F5344CB8AC3E}">
-        <p14:creationId xmlns="" xmlns:p14="http://schemas.microsoft.com/office/powerpoint/2010/main" val="1107272036"/>
+        <p14:creationId xmlns:p14="http://schemas.microsoft.com/office/powerpoint/2010/main" xmlns="" val="1107272036"/>
       </p:ext>
     </p:extLst>
   </p:cSld>
@@ -3166,7 +3166,7 @@
     </p:spTree>
     <p:extLst>
       <p:ext uri="{BB962C8B-B14F-4D97-AF65-F5344CB8AC3E}">
-        <p14:creationId xmlns="" xmlns:p14="http://schemas.microsoft.com/office/powerpoint/2010/main" val="3881645675"/>
+        <p14:creationId xmlns:p14="http://schemas.microsoft.com/office/powerpoint/2010/main" xmlns="" val="3881645675"/>
       </p:ext>
     </p:extLst>
   </p:cSld>
@@ -3254,7 +3254,7 @@
           <a:blip r:embed="rId2">
             <a:extLst>
               <a:ext uri="{28A0092B-C50C-407E-A947-70E740481C1C}">
-                <a14:useLocalDpi xmlns="" xmlns:a14="http://schemas.microsoft.com/office/drawing/2010/main" val="0"/>
+                <a14:useLocalDpi xmlns:a14="http://schemas.microsoft.com/office/drawing/2010/main" xmlns="" val="0"/>
               </a:ext>
             </a:extLst>
           </a:blip>
@@ -3280,7 +3280,7 @@
     </p:spTree>
     <p:extLst>
       <p:ext uri="{BB962C8B-B14F-4D97-AF65-F5344CB8AC3E}">
-        <p14:creationId xmlns="" xmlns:p14="http://schemas.microsoft.com/office/powerpoint/2010/main" val="4020942080"/>
+        <p14:creationId xmlns:p14="http://schemas.microsoft.com/office/powerpoint/2010/main" xmlns="" val="4020942080"/>
       </p:ext>
     </p:extLst>
   </p:cSld>
@@ -3368,7 +3368,7 @@
           <a:blip r:embed="rId2">
             <a:extLst>
               <a:ext uri="{28A0092B-C50C-407E-A947-70E740481C1C}">
-                <a14:useLocalDpi xmlns="" xmlns:a14="http://schemas.microsoft.com/office/drawing/2010/main" val="0"/>
+                <a14:useLocalDpi xmlns:a14="http://schemas.microsoft.com/office/drawing/2010/main" xmlns="" val="0"/>
               </a:ext>
             </a:extLst>
           </a:blip>
@@ -3391,14 +3391,14 @@
           </a:ln>
           <a:extLst>
             <a:ext uri="{909E8E84-426E-40DD-AFC4-6F175D3DCCD1}">
-              <a14:hiddenFill xmlns="" xmlns:a14="http://schemas.microsoft.com/office/drawing/2010/main">
+              <a14:hiddenFill xmlns:a14="http://schemas.microsoft.com/office/drawing/2010/main" xmlns="">
                 <a:solidFill>
                   <a:srgbClr val="FFFFFF"/>
                 </a:solidFill>
               </a14:hiddenFill>
             </a:ext>
             <a:ext uri="{91240B29-F687-4F45-9708-019B960494DF}">
-              <a14:hiddenLine xmlns="" xmlns:a14="http://schemas.microsoft.com/office/drawing/2010/main" w="9525">
+              <a14:hiddenLine xmlns:a14="http://schemas.microsoft.com/office/drawing/2010/main" xmlns="" w="9525">
                 <a:solidFill>
                   <a:srgbClr val="000000"/>
                 </a:solidFill>
@@ -3413,7 +3413,7 @@
     </p:spTree>
     <p:extLst>
       <p:ext uri="{BB962C8B-B14F-4D97-AF65-F5344CB8AC3E}">
-        <p14:creationId xmlns="" xmlns:p14="http://schemas.microsoft.com/office/powerpoint/2010/main" val="1412421479"/>
+        <p14:creationId xmlns:p14="http://schemas.microsoft.com/office/powerpoint/2010/main" xmlns="" val="1412421479"/>
       </p:ext>
     </p:extLst>
   </p:cSld>
@@ -3501,7 +3501,7 @@
           <a:blip r:embed="rId2">
             <a:extLst>
               <a:ext uri="{28A0092B-C50C-407E-A947-70E740481C1C}">
-                <a14:useLocalDpi xmlns="" xmlns:a14="http://schemas.microsoft.com/office/drawing/2010/main" val="0"/>
+                <a14:useLocalDpi xmlns:a14="http://schemas.microsoft.com/office/drawing/2010/main" xmlns="" val="0"/>
               </a:ext>
             </a:extLst>
           </a:blip>
@@ -3536,7 +3536,7 @@
           <a:blip r:embed="rId3">
             <a:extLst>
               <a:ext uri="{28A0092B-C50C-407E-A947-70E740481C1C}">
-                <a14:useLocalDpi xmlns="" xmlns:a14="http://schemas.microsoft.com/office/drawing/2010/main" val="0"/>
+                <a14:useLocalDpi xmlns:a14="http://schemas.microsoft.com/office/drawing/2010/main" xmlns="" val="0"/>
               </a:ext>
             </a:extLst>
           </a:blip>
@@ -3562,7 +3562,7 @@
     </p:spTree>
     <p:extLst>
       <p:ext uri="{BB962C8B-B14F-4D97-AF65-F5344CB8AC3E}">
-        <p14:creationId xmlns="" xmlns:p14="http://schemas.microsoft.com/office/powerpoint/2010/main" val="1287752426"/>
+        <p14:creationId xmlns:p14="http://schemas.microsoft.com/office/powerpoint/2010/main" xmlns="" val="1287752426"/>
       </p:ext>
     </p:extLst>
   </p:cSld>
@@ -3629,27 +3629,14 @@
           <a:p>
             <a:r>
               <a:rPr lang="ru-RU" dirty="0" smtClean="0"/>
-              <a:t>Гибкая кодовая </a:t>
-            </a:r>
+              <a:t>Гибкая кодовая база</a:t>
+            </a:r>
+          </a:p>
+          <a:p>
             <a:r>
               <a:rPr lang="ru-RU" dirty="0" smtClean="0"/>
-              <a:t>база</a:t>
-            </a:r>
-          </a:p>
-          <a:p>
-            <a:r>
-              <a:rPr lang="ru-RU" dirty="0" smtClean="0"/>
-              <a:t>Возможность применения как </a:t>
-            </a:r>
-            <a:r>
-              <a:rPr lang="ru-RU" dirty="0" smtClean="0"/>
-              <a:t>в любительских </a:t>
-            </a:r>
-            <a:r>
-              <a:rPr lang="ru-RU" dirty="0" smtClean="0"/>
-              <a:t>кругах, так и в научных</a:t>
-            </a:r>
-            <a:endParaRPr lang="ru-RU" dirty="0" smtClean="0"/>
+              <a:t>Возможность применения как в любительских кругах, так и в научных</a:t>
+            </a:r>
           </a:p>
           <a:p>
             <a:endParaRPr lang="ru-RU" dirty="0"/>
@@ -3659,7 +3646,7 @@
     </p:spTree>
     <p:extLst>
       <p:ext uri="{BB962C8B-B14F-4D97-AF65-F5344CB8AC3E}">
-        <p14:creationId xmlns="" xmlns:p14="http://schemas.microsoft.com/office/powerpoint/2010/main" val="1539667541"/>
+        <p14:creationId xmlns:p14="http://schemas.microsoft.com/office/powerpoint/2010/main" xmlns="" val="1539667541"/>
       </p:ext>
     </p:extLst>
   </p:cSld>
@@ -3824,10 +3811,70 @@
           </a:p>
         </p:txBody>
       </p:sp>
+      <p:pic>
+        <p:nvPicPr>
+          <p:cNvPr id="1026" name="Picture 2" descr="http://qrcoder.ru/code/?https%3A%2F%2Fgithub.com%2FProMix0%2FProjectCalculis&amp;4&amp;0"/>
+          <p:cNvPicPr>
+            <a:picLocks noChangeAspect="1" noChangeArrowheads="1"/>
+          </p:cNvPicPr>
+          <p:nvPr/>
+        </p:nvPicPr>
+        <p:blipFill>
+          <a:blip r:embed="rId6"/>
+          <a:srcRect/>
+          <a:stretch>
+            <a:fillRect/>
+          </a:stretch>
+        </p:blipFill>
+        <p:spPr bwMode="auto">
+          <a:xfrm>
+            <a:off x="8445730" y="4311823"/>
+            <a:ext cx="2546177" cy="2546177"/>
+          </a:xfrm>
+          <a:prstGeom prst="rect">
+            <a:avLst/>
+          </a:prstGeom>
+          <a:noFill/>
+        </p:spPr>
+      </p:pic>
+      <p:sp>
+        <p:nvSpPr>
+          <p:cNvPr id="5" name="TextBox 4"/>
+          <p:cNvSpPr txBox="1"/>
+          <p:nvPr/>
+        </p:nvSpPr>
+        <p:spPr>
+          <a:xfrm>
+            <a:off x="5503025" y="4971011"/>
+            <a:ext cx="3132480" cy="1200329"/>
+          </a:xfrm>
+          <a:prstGeom prst="rect">
+            <a:avLst/>
+          </a:prstGeom>
+          <a:noFill/>
+        </p:spPr>
+        <p:txBody>
+          <a:bodyPr wrap="square" rtlCol="0">
+            <a:spAutoFit/>
+          </a:bodyPr>
+          <a:lstStyle/>
+          <a:p>
+            <a:r>
+              <a:rPr lang="ru-RU" sz="3600" dirty="0" err="1" smtClean="0"/>
+              <a:t>Репозиторий</a:t>
+            </a:r>
+            <a:r>
+              <a:rPr lang="ru-RU" sz="3600" dirty="0" smtClean="0"/>
+              <a:t> проекта</a:t>
+            </a:r>
+            <a:endParaRPr lang="ru-RU" sz="3600" dirty="0"/>
+          </a:p>
+        </p:txBody>
+      </p:sp>
     </p:spTree>
     <p:extLst>
       <p:ext uri="{BB962C8B-B14F-4D97-AF65-F5344CB8AC3E}">
-        <p14:creationId xmlns="" xmlns:p14="http://schemas.microsoft.com/office/powerpoint/2010/main" val="729306326"/>
+        <p14:creationId xmlns:p14="http://schemas.microsoft.com/office/powerpoint/2010/main" xmlns="" val="729306326"/>
       </p:ext>
     </p:extLst>
   </p:cSld>
@@ -3906,7 +3953,7 @@
           <a:blip r:embed="rId2">
             <a:extLst>
               <a:ext uri="{28A0092B-C50C-407E-A947-70E740481C1C}">
-                <a14:useLocalDpi xmlns="" xmlns:a14="http://schemas.microsoft.com/office/drawing/2010/main" val="0"/>
+                <a14:useLocalDpi xmlns:a14="http://schemas.microsoft.com/office/drawing/2010/main" xmlns="" val="0"/>
               </a:ext>
             </a:extLst>
           </a:blip>
@@ -3932,7 +3979,7 @@
     </p:spTree>
     <p:extLst>
       <p:ext uri="{BB962C8B-B14F-4D97-AF65-F5344CB8AC3E}">
-        <p14:creationId xmlns="" xmlns:p14="http://schemas.microsoft.com/office/powerpoint/2010/main" val="1571810882"/>
+        <p14:creationId xmlns:p14="http://schemas.microsoft.com/office/powerpoint/2010/main" xmlns="" val="1571810882"/>
       </p:ext>
     </p:extLst>
   </p:cSld>
@@ -4008,7 +4055,6 @@
               <a:rPr lang="ru-RU" dirty="0" smtClean="0"/>
               <a:t>вычислений</a:t>
             </a:r>
-            <a:endParaRPr lang="ru-RU" dirty="0" smtClean="0"/>
           </a:p>
           <a:p>
             <a:pPr marL="0" indent="0">
@@ -4049,7 +4095,7 @@
     </p:spTree>
     <p:extLst>
       <p:ext uri="{BB962C8B-B14F-4D97-AF65-F5344CB8AC3E}">
-        <p14:creationId xmlns="" xmlns:p14="http://schemas.microsoft.com/office/powerpoint/2010/main" val="717234678"/>
+        <p14:creationId xmlns:p14="http://schemas.microsoft.com/office/powerpoint/2010/main" xmlns="" val="717234678"/>
       </p:ext>
     </p:extLst>
   </p:cSld>
@@ -4476,7 +4522,7 @@
     </p:spTree>
     <p:extLst>
       <p:ext uri="{BB962C8B-B14F-4D97-AF65-F5344CB8AC3E}">
-        <p14:creationId xmlns="" xmlns:p14="http://schemas.microsoft.com/office/powerpoint/2010/main" val="2281005313"/>
+        <p14:creationId xmlns:p14="http://schemas.microsoft.com/office/powerpoint/2010/main" xmlns="" val="2281005313"/>
       </p:ext>
     </p:extLst>
   </p:cSld>
@@ -4582,7 +4628,7 @@
     </p:spTree>
     <p:extLst>
       <p:ext uri="{BB962C8B-B14F-4D97-AF65-F5344CB8AC3E}">
-        <p14:creationId xmlns="" xmlns:p14="http://schemas.microsoft.com/office/powerpoint/2010/main" val="3787781005"/>
+        <p14:creationId xmlns:p14="http://schemas.microsoft.com/office/powerpoint/2010/main" xmlns="" val="3787781005"/>
       </p:ext>
     </p:extLst>
   </p:cSld>
@@ -4656,7 +4702,7 @@
           <a:blip r:embed="rId2">
             <a:extLst>
               <a:ext uri="{28A0092B-C50C-407E-A947-70E740481C1C}">
-                <a14:useLocalDpi xmlns="" xmlns:a14="http://schemas.microsoft.com/office/drawing/2010/main" val="0"/>
+                <a14:useLocalDpi xmlns:a14="http://schemas.microsoft.com/office/drawing/2010/main" xmlns="" val="0"/>
               </a:ext>
             </a:extLst>
           </a:blip>
@@ -4676,7 +4722,7 @@
           <a:noFill/>
           <a:extLst>
             <a:ext uri="{909E8E84-426E-40DD-AFC4-6F175D3DCCD1}">
-              <a14:hiddenFill xmlns="" xmlns:a14="http://schemas.microsoft.com/office/drawing/2010/main">
+              <a14:hiddenFill xmlns:a14="http://schemas.microsoft.com/office/drawing/2010/main" xmlns="">
                 <a:solidFill>
                   <a:srgbClr val="FFFFFF"/>
                 </a:solidFill>
@@ -4688,7 +4734,7 @@
     </p:spTree>
     <p:extLst>
       <p:ext uri="{BB962C8B-B14F-4D97-AF65-F5344CB8AC3E}">
-        <p14:creationId xmlns="" xmlns:p14="http://schemas.microsoft.com/office/powerpoint/2010/main" val="1996465122"/>
+        <p14:creationId xmlns:p14="http://schemas.microsoft.com/office/powerpoint/2010/main" xmlns="" val="1996465122"/>
       </p:ext>
     </p:extLst>
   </p:cSld>
@@ -4791,7 +4837,7 @@
     </p:spTree>
     <p:extLst>
       <p:ext uri="{BB962C8B-B14F-4D97-AF65-F5344CB8AC3E}">
-        <p14:creationId xmlns="" xmlns:p14="http://schemas.microsoft.com/office/powerpoint/2010/main" val="3629204476"/>
+        <p14:creationId xmlns:p14="http://schemas.microsoft.com/office/powerpoint/2010/main" xmlns="" val="3629204476"/>
       </p:ext>
     </p:extLst>
   </p:cSld>
@@ -4879,7 +4925,7 @@
           <a:blip r:embed="rId2">
             <a:extLst>
               <a:ext uri="{28A0092B-C50C-407E-A947-70E740481C1C}">
-                <a14:useLocalDpi xmlns="" xmlns:a14="http://schemas.microsoft.com/office/drawing/2010/main" val="0"/>
+                <a14:useLocalDpi xmlns:a14="http://schemas.microsoft.com/office/drawing/2010/main" xmlns="" val="0"/>
               </a:ext>
             </a:extLst>
           </a:blip>
@@ -4899,7 +4945,7 @@
           <a:noFill/>
           <a:extLst>
             <a:ext uri="{909E8E84-426E-40DD-AFC4-6F175D3DCCD1}">
-              <a14:hiddenFill xmlns="" xmlns:a14="http://schemas.microsoft.com/office/drawing/2010/main">
+              <a14:hiddenFill xmlns:a14="http://schemas.microsoft.com/office/drawing/2010/main" xmlns="">
                 <a:solidFill>
                   <a:srgbClr val="FFFFFF"/>
                 </a:solidFill>
@@ -4911,7 +4957,7 @@
     </p:spTree>
     <p:extLst>
       <p:ext uri="{BB962C8B-B14F-4D97-AF65-F5344CB8AC3E}">
-        <p14:creationId xmlns="" xmlns:p14="http://schemas.microsoft.com/office/powerpoint/2010/main" val="2889262611"/>
+        <p14:creationId xmlns:p14="http://schemas.microsoft.com/office/powerpoint/2010/main" xmlns="" val="2889262611"/>
       </p:ext>
     </p:extLst>
   </p:cSld>
@@ -5183,7 +5229,7 @@
   <a:extraClrSchemeLst/>
   <a:extLst>
     <a:ext uri="{05A4C25C-085E-4340-85A3-A5531E510DB2}">
-      <thm15:themeFamily xmlns="" xmlns:thm15="http://schemas.microsoft.com/office/thememl/2012/main" name="Office Theme" id="{62F939B6-93AF-4DB8-9C6B-D6C7DFDC589F}" vid="{4A3C46E8-61CC-4603-A589-7422A47A8E4A}"/>
+      <thm15:themeFamily xmlns:thm15="http://schemas.microsoft.com/office/thememl/2012/main" xmlns="" name="Office Theme" id="{62F939B6-93AF-4DB8-9C6B-D6C7DFDC589F}" vid="{4A3C46E8-61CC-4603-A589-7422A47A8E4A}"/>
     </a:ext>
   </a:extLst>
 </a:theme>

</xml_diff>